<commit_message>
M1 C1 P1 e M2 C1 P1
</commit_message>
<xml_diff>
--- a/curso/modulo1capitulo1.pptx
+++ b/curso/modulo1capitulo1.pptx
@@ -11,17 +11,18 @@
     <p:sldId id="261" r:id="rId5"/>
     <p:sldId id="258" r:id="rId6"/>
     <p:sldId id="259" r:id="rId7"/>
-    <p:sldId id="260" r:id="rId8"/>
-    <p:sldId id="266" r:id="rId9"/>
-    <p:sldId id="267" r:id="rId10"/>
-    <p:sldId id="268" r:id="rId11"/>
-    <p:sldId id="271" r:id="rId12"/>
-    <p:sldId id="272" r:id="rId13"/>
-    <p:sldId id="273" r:id="rId14"/>
-    <p:sldId id="270" r:id="rId15"/>
-    <p:sldId id="262" r:id="rId16"/>
-    <p:sldId id="263" r:id="rId17"/>
-    <p:sldId id="269" r:id="rId18"/>
+    <p:sldId id="274" r:id="rId8"/>
+    <p:sldId id="260" r:id="rId9"/>
+    <p:sldId id="266" r:id="rId10"/>
+    <p:sldId id="267" r:id="rId11"/>
+    <p:sldId id="268" r:id="rId12"/>
+    <p:sldId id="271" r:id="rId13"/>
+    <p:sldId id="272" r:id="rId14"/>
+    <p:sldId id="273" r:id="rId15"/>
+    <p:sldId id="270" r:id="rId16"/>
+    <p:sldId id="262" r:id="rId17"/>
+    <p:sldId id="263" r:id="rId18"/>
+    <p:sldId id="269" r:id="rId19"/>
   </p:sldIdLst>
   <p:sldSz cx="9144000" cy="6858000" type="screen4x3"/>
   <p:notesSz cx="6858000" cy="9144000"/>
@@ -508,7 +509,7 @@
             <a:fld id="{960601EF-B919-41BC-A375-4AA53B88DA6F}" type="datetimeFigureOut">
               <a:rPr lang="pt-BR" smtClean="0"/>
               <a:pPr/>
-              <a:t>27/7/2014</a:t>
+              <a:t>27/6/2015</a:t>
             </a:fld>
             <a:endParaRPr lang="pt-BR"/>
           </a:p>
@@ -675,7 +676,7 @@
             <a:fld id="{960601EF-B919-41BC-A375-4AA53B88DA6F}" type="datetimeFigureOut">
               <a:rPr lang="pt-BR" smtClean="0"/>
               <a:pPr/>
-              <a:t>27/7/2014</a:t>
+              <a:t>27/6/2015</a:t>
             </a:fld>
             <a:endParaRPr lang="pt-BR"/>
           </a:p>
@@ -852,7 +853,7 @@
             <a:fld id="{960601EF-B919-41BC-A375-4AA53B88DA6F}" type="datetimeFigureOut">
               <a:rPr lang="pt-BR" smtClean="0"/>
               <a:pPr/>
-              <a:t>27/7/2014</a:t>
+              <a:t>27/6/2015</a:t>
             </a:fld>
             <a:endParaRPr lang="pt-BR"/>
           </a:p>
@@ -1023,7 +1024,7 @@
             <a:fld id="{960601EF-B919-41BC-A375-4AA53B88DA6F}" type="datetimeFigureOut">
               <a:rPr lang="pt-BR" smtClean="0"/>
               <a:pPr/>
-              <a:t>27/7/2014</a:t>
+              <a:t>27/6/2015</a:t>
             </a:fld>
             <a:endParaRPr lang="pt-BR"/>
           </a:p>
@@ -1480,7 +1481,7 @@
             <a:fld id="{960601EF-B919-41BC-A375-4AA53B88DA6F}" type="datetimeFigureOut">
               <a:rPr lang="pt-BR" smtClean="0"/>
               <a:pPr/>
-              <a:t>27/7/2014</a:t>
+              <a:t>27/6/2015</a:t>
             </a:fld>
             <a:endParaRPr lang="pt-BR"/>
           </a:p>
@@ -1746,7 +1747,7 @@
             <a:fld id="{960601EF-B919-41BC-A375-4AA53B88DA6F}" type="datetimeFigureOut">
               <a:rPr lang="pt-BR" smtClean="0"/>
               <a:pPr/>
-              <a:t>27/7/2014</a:t>
+              <a:t>27/6/2015</a:t>
             </a:fld>
             <a:endParaRPr lang="pt-BR"/>
           </a:p>
@@ -2122,7 +2123,7 @@
             <a:fld id="{960601EF-B919-41BC-A375-4AA53B88DA6F}" type="datetimeFigureOut">
               <a:rPr lang="pt-BR" smtClean="0"/>
               <a:pPr/>
-              <a:t>27/7/2014</a:t>
+              <a:t>27/6/2015</a:t>
             </a:fld>
             <a:endParaRPr lang="pt-BR"/>
           </a:p>
@@ -2246,7 +2247,7 @@
             <a:fld id="{960601EF-B919-41BC-A375-4AA53B88DA6F}" type="datetimeFigureOut">
               <a:rPr lang="pt-BR" smtClean="0"/>
               <a:pPr/>
-              <a:t>27/7/2014</a:t>
+              <a:t>27/6/2015</a:t>
             </a:fld>
             <a:endParaRPr lang="pt-BR"/>
           </a:p>
@@ -2338,7 +2339,7 @@
             <a:fld id="{960601EF-B919-41BC-A375-4AA53B88DA6F}" type="datetimeFigureOut">
               <a:rPr lang="pt-BR" smtClean="0"/>
               <a:pPr/>
-              <a:t>27/7/2014</a:t>
+              <a:t>27/6/2015</a:t>
             </a:fld>
             <a:endParaRPr lang="pt-BR"/>
           </a:p>
@@ -2589,7 +2590,7 @@
             <a:fld id="{960601EF-B919-41BC-A375-4AA53B88DA6F}" type="datetimeFigureOut">
               <a:rPr lang="pt-BR" smtClean="0"/>
               <a:pPr/>
-              <a:t>27/7/2014</a:t>
+              <a:t>27/6/2015</a:t>
             </a:fld>
             <a:endParaRPr lang="pt-BR"/>
           </a:p>
@@ -2850,7 +2851,7 @@
             <a:fld id="{960601EF-B919-41BC-A375-4AA53B88DA6F}" type="datetimeFigureOut">
               <a:rPr lang="pt-BR" smtClean="0"/>
               <a:pPr/>
-              <a:t>27/7/2014</a:t>
+              <a:t>27/6/2015</a:t>
             </a:fld>
             <a:endParaRPr lang="pt-BR"/>
           </a:p>
@@ -3256,7 +3257,7 @@
             <a:fld id="{960601EF-B919-41BC-A375-4AA53B88DA6F}" type="datetimeFigureOut">
               <a:rPr lang="pt-BR" smtClean="0"/>
               <a:pPr/>
-              <a:t>27/7/2014</a:t>
+              <a:t>27/6/2015</a:t>
             </a:fld>
             <a:endParaRPr lang="pt-BR"/>
           </a:p>
@@ -3789,6 +3790,233 @@
           <a:p>
             <a:r>
               <a:rPr lang="pt-BR" dirty="0" smtClean="0"/>
+              <a:t>Plataforma .NET (Microsoft)</a:t>
+            </a:r>
+            <a:endParaRPr lang="pt-BR" dirty="0"/>
+          </a:p>
+        </p:txBody>
+      </p:sp>
+      <p:sp>
+        <p:nvSpPr>
+          <p:cNvPr id="3" name="Espaço Reservado para Conteúdo 2"/>
+          <p:cNvSpPr>
+            <a:spLocks noGrp="1"/>
+          </p:cNvSpPr>
+          <p:nvPr>
+            <p:ph idx="1"/>
+          </p:nvPr>
+        </p:nvSpPr>
+        <p:spPr/>
+        <p:txBody>
+          <a:bodyPr/>
+          <a:lstStyle/>
+          <a:p>
+            <a:r>
+              <a:rPr lang="pt-BR" dirty="0" smtClean="0"/>
+              <a:t>Consiste de dois componentes principais:</a:t>
+            </a:r>
+          </a:p>
+          <a:p>
+            <a:pPr lvl="1"/>
+            <a:r>
+              <a:rPr lang="pt-BR" dirty="0" smtClean="0">
+                <a:solidFill>
+                  <a:srgbClr val="92D050"/>
+                </a:solidFill>
+              </a:rPr>
+              <a:t>CLR</a:t>
+            </a:r>
+            <a:r>
+              <a:rPr lang="pt-BR" dirty="0" smtClean="0"/>
+              <a:t> (</a:t>
+            </a:r>
+            <a:r>
+              <a:rPr lang="pt-BR" dirty="0" err="1" smtClean="0"/>
+              <a:t>Common</a:t>
+            </a:r>
+            <a:r>
+              <a:rPr lang="pt-BR" dirty="0" smtClean="0"/>
+              <a:t> </a:t>
+            </a:r>
+            <a:r>
+              <a:rPr lang="pt-BR" dirty="0" err="1" smtClean="0"/>
+              <a:t>Language</a:t>
+            </a:r>
+            <a:r>
+              <a:rPr lang="pt-BR" dirty="0" smtClean="0"/>
+              <a:t> </a:t>
+            </a:r>
+            <a:r>
+              <a:rPr lang="pt-BR" dirty="0" err="1" smtClean="0"/>
+              <a:t>Runtime</a:t>
+            </a:r>
+            <a:r>
+              <a:rPr lang="pt-BR" dirty="0" smtClean="0"/>
+              <a:t>)</a:t>
+            </a:r>
+          </a:p>
+          <a:p>
+            <a:pPr lvl="1"/>
+            <a:r>
+              <a:rPr lang="pt-BR" dirty="0" smtClean="0">
+                <a:solidFill>
+                  <a:srgbClr val="92D050"/>
+                </a:solidFill>
+              </a:rPr>
+              <a:t>FCL</a:t>
+            </a:r>
+            <a:r>
+              <a:rPr lang="pt-BR" dirty="0" smtClean="0"/>
+              <a:t> (Framework </a:t>
+            </a:r>
+            <a:r>
+              <a:rPr lang="pt-BR" dirty="0" err="1" smtClean="0"/>
+              <a:t>Class</a:t>
+            </a:r>
+            <a:r>
+              <a:rPr lang="pt-BR" dirty="0" smtClean="0"/>
+              <a:t> </a:t>
+            </a:r>
+            <a:r>
+              <a:rPr lang="pt-BR" dirty="0" err="1" smtClean="0"/>
+              <a:t>Library</a:t>
+            </a:r>
+            <a:r>
+              <a:rPr lang="pt-BR" dirty="0" smtClean="0"/>
+              <a:t>)</a:t>
+            </a:r>
+          </a:p>
+          <a:p>
+            <a:r>
+              <a:rPr lang="pt-BR" dirty="0" smtClean="0"/>
+              <a:t>Essa arquitetura é capaz de executar </a:t>
+            </a:r>
+            <a:r>
+              <a:rPr lang="pt-BR" dirty="0" smtClean="0">
+                <a:solidFill>
+                  <a:srgbClr val="92D050"/>
+                </a:solidFill>
+              </a:rPr>
+              <a:t>33</a:t>
+            </a:r>
+            <a:r>
+              <a:rPr lang="pt-BR" dirty="0" smtClean="0"/>
+              <a:t> linguagens de programação diferentes</a:t>
+            </a:r>
+          </a:p>
+          <a:p>
+            <a:pPr lvl="1"/>
+            <a:r>
+              <a:rPr lang="pt-BR" dirty="0" smtClean="0"/>
+              <a:t>C#, VB, Java, C++, </a:t>
+            </a:r>
+            <a:r>
+              <a:rPr lang="pt-BR" dirty="0" err="1" smtClean="0"/>
+              <a:t>Python</a:t>
+            </a:r>
+            <a:r>
+              <a:rPr lang="pt-BR" dirty="0" smtClean="0"/>
+              <a:t>, Pascal, Delphi...</a:t>
+            </a:r>
+          </a:p>
+          <a:p>
+            <a:r>
+              <a:rPr lang="pt-BR" dirty="0" smtClean="0"/>
+              <a:t>Também permite o desenvolvimento de </a:t>
+            </a:r>
+            <a:r>
+              <a:rPr lang="pt-BR" dirty="0" smtClean="0">
+                <a:solidFill>
+                  <a:srgbClr val="92D050"/>
+                </a:solidFill>
+              </a:rPr>
+              <a:t>aplicações web</a:t>
+            </a:r>
+          </a:p>
+        </p:txBody>
+      </p:sp>
+      <p:pic>
+        <p:nvPicPr>
+          <p:cNvPr id="4" name="Picture 3"/>
+          <p:cNvPicPr>
+            <a:picLocks noChangeAspect="1" noChangeArrowheads="1"/>
+          </p:cNvPicPr>
+          <p:nvPr/>
+        </p:nvPicPr>
+        <p:blipFill>
+          <a:blip r:embed="rId2"/>
+          <a:srcRect/>
+          <a:stretch>
+            <a:fillRect/>
+          </a:stretch>
+        </p:blipFill>
+        <p:spPr bwMode="auto">
+          <a:xfrm>
+            <a:off x="6307283" y="6072206"/>
+            <a:ext cx="2836717" cy="785794"/>
+          </a:xfrm>
+          <a:prstGeom prst="rect">
+            <a:avLst/>
+          </a:prstGeom>
+          <a:noFill/>
+          <a:ln w="9525">
+            <a:noFill/>
+            <a:miter lim="800000"/>
+            <a:headEnd/>
+            <a:tailEnd/>
+          </a:ln>
+          <a:effectLst/>
+        </p:spPr>
+      </p:pic>
+    </p:spTree>
+  </p:cSld>
+  <p:clrMapOvr>
+    <a:masterClrMapping/>
+  </p:clrMapOvr>
+  <p:timing>
+    <p:tnLst>
+      <p:par>
+        <p:cTn id="1" dur="indefinite" restart="never" nodeType="tmRoot"/>
+      </p:par>
+    </p:tnLst>
+  </p:timing>
+</p:sld>
+</file>
+
+<file path=ppt/slides/slide11.xml><?xml version="1.0" encoding="utf-8"?>
+<p:sld xmlns:a="http://schemas.openxmlformats.org/drawingml/2006/main" xmlns:r="http://schemas.openxmlformats.org/officeDocument/2006/relationships" xmlns:p="http://schemas.openxmlformats.org/presentationml/2006/main">
+  <p:cSld>
+    <p:spTree>
+      <p:nvGrpSpPr>
+        <p:cNvPr id="1" name=""/>
+        <p:cNvGrpSpPr/>
+        <p:nvPr/>
+      </p:nvGrpSpPr>
+      <p:grpSpPr>
+        <a:xfrm>
+          <a:off x="0" y="0"/>
+          <a:ext cx="0" cy="0"/>
+          <a:chOff x="0" y="0"/>
+          <a:chExt cx="0" cy="0"/>
+        </a:xfrm>
+      </p:grpSpPr>
+      <p:sp>
+        <p:nvSpPr>
+          <p:cNvPr id="2" name="Título 1"/>
+          <p:cNvSpPr>
+            <a:spLocks noGrp="1"/>
+          </p:cNvSpPr>
+          <p:nvPr>
+            <p:ph type="title"/>
+          </p:nvPr>
+        </p:nvSpPr>
+        <p:spPr/>
+        <p:txBody>
+          <a:bodyPr/>
+          <a:lstStyle/>
+          <a:p>
+            <a:r>
+              <a:rPr lang="pt-BR" dirty="0" smtClean="0"/>
               <a:t>Plataforma Mono</a:t>
             </a:r>
             <a:endParaRPr lang="pt-BR" dirty="0"/>
@@ -4003,164 +4231,6 @@
 </p:sld>
 </file>
 
-<file path=ppt/slides/slide11.xml><?xml version="1.0" encoding="utf-8"?>
-<p:sld xmlns:a="http://schemas.openxmlformats.org/drawingml/2006/main" xmlns:r="http://schemas.openxmlformats.org/officeDocument/2006/relationships" xmlns:p="http://schemas.openxmlformats.org/presentationml/2006/main">
-  <p:cSld>
-    <p:spTree>
-      <p:nvGrpSpPr>
-        <p:cNvPr id="1" name=""/>
-        <p:cNvGrpSpPr/>
-        <p:nvPr/>
-      </p:nvGrpSpPr>
-      <p:grpSpPr>
-        <a:xfrm>
-          <a:off x="0" y="0"/>
-          <a:ext cx="0" cy="0"/>
-          <a:chOff x="0" y="0"/>
-          <a:chExt cx="0" cy="0"/>
-        </a:xfrm>
-      </p:grpSpPr>
-      <p:sp>
-        <p:nvSpPr>
-          <p:cNvPr id="2" name="Título 1"/>
-          <p:cNvSpPr>
-            <a:spLocks noGrp="1"/>
-          </p:cNvSpPr>
-          <p:nvPr>
-            <p:ph type="title"/>
-          </p:nvPr>
-        </p:nvSpPr>
-        <p:spPr/>
-        <p:txBody>
-          <a:bodyPr/>
-          <a:lstStyle/>
-          <a:p>
-            <a:r>
-              <a:rPr lang="pt-BR" dirty="0" smtClean="0"/>
-              <a:t>Conceitos</a:t>
-            </a:r>
-            <a:endParaRPr lang="pt-BR" dirty="0"/>
-          </a:p>
-        </p:txBody>
-      </p:sp>
-      <p:sp>
-        <p:nvSpPr>
-          <p:cNvPr id="3" name="Espaço Reservado para Conteúdo 2"/>
-          <p:cNvSpPr>
-            <a:spLocks noGrp="1"/>
-          </p:cNvSpPr>
-          <p:nvPr>
-            <p:ph idx="1"/>
-          </p:nvPr>
-        </p:nvSpPr>
-        <p:spPr/>
-        <p:txBody>
-          <a:bodyPr>
-            <a:normAutofit/>
-          </a:bodyPr>
-          <a:lstStyle/>
-          <a:p>
-            <a:r>
-              <a:rPr lang="pt-BR" dirty="0" smtClean="0">
-                <a:solidFill>
-                  <a:srgbClr val="92D050"/>
-                </a:solidFill>
-              </a:rPr>
-              <a:t>Programa: </a:t>
-            </a:r>
-            <a:r>
-              <a:rPr lang="pt-BR" dirty="0" smtClean="0"/>
-              <a:t>conjunto dos arquivos </a:t>
-            </a:r>
-            <a:r>
-              <a:rPr lang="pt-BR" dirty="0" smtClean="0"/>
-              <a:t>binários </a:t>
-            </a:r>
-            <a:r>
-              <a:rPr lang="pt-BR" dirty="0" smtClean="0"/>
-              <a:t>e periféricos armazenados no disco rígido.</a:t>
-            </a:r>
-          </a:p>
-          <a:p>
-            <a:r>
-              <a:rPr lang="pt-BR" dirty="0" smtClean="0"/>
-              <a:t>Um programa tem as seguintes características:</a:t>
-            </a:r>
-          </a:p>
-          <a:p>
-            <a:pPr lvl="1"/>
-            <a:r>
-              <a:rPr lang="pt-BR" dirty="0" smtClean="0"/>
-              <a:t>É escrito em uma determinada </a:t>
-            </a:r>
-            <a:r>
-              <a:rPr lang="pt-BR" dirty="0" smtClean="0">
-                <a:solidFill>
-                  <a:srgbClr val="92D050"/>
-                </a:solidFill>
-              </a:rPr>
-              <a:t>linguagem</a:t>
-            </a:r>
-            <a:r>
-              <a:rPr lang="pt-BR" dirty="0" smtClean="0"/>
-              <a:t>;</a:t>
-            </a:r>
-          </a:p>
-          <a:p>
-            <a:pPr lvl="1"/>
-            <a:r>
-              <a:rPr lang="pt-BR" dirty="0" smtClean="0"/>
-              <a:t>O texto escrito pelo programador chama-se </a:t>
-            </a:r>
-            <a:r>
-              <a:rPr lang="pt-BR" dirty="0" smtClean="0">
-                <a:solidFill>
-                  <a:srgbClr val="92D050"/>
-                </a:solidFill>
-              </a:rPr>
-              <a:t>código-fonte</a:t>
-            </a:r>
-            <a:r>
-              <a:rPr lang="pt-BR" dirty="0" smtClean="0"/>
-              <a:t>;</a:t>
-            </a:r>
-          </a:p>
-          <a:p>
-            <a:pPr lvl="1"/>
-            <a:r>
-              <a:rPr lang="pt-BR" dirty="0" smtClean="0"/>
-              <a:t>Possui um arquivo </a:t>
-            </a:r>
-            <a:r>
-              <a:rPr lang="pt-BR" dirty="0" smtClean="0">
-                <a:solidFill>
-                  <a:srgbClr val="92D050"/>
-                </a:solidFill>
-              </a:rPr>
-              <a:t>executável</a:t>
-            </a:r>
-            <a:r>
-              <a:rPr lang="pt-BR" dirty="0" smtClean="0"/>
-              <a:t>.</a:t>
-            </a:r>
-          </a:p>
-        </p:txBody>
-      </p:sp>
-    </p:spTree>
-  </p:cSld>
-  <p:clrMapOvr>
-    <a:masterClrMapping/>
-  </p:clrMapOvr>
-  <p:timing>
-    <p:tnLst>
-      <p:par>
-        <p:cTn id="1" dur="indefinite" restart="never" nodeType="tmRoot"/>
-      </p:par>
-    </p:tnLst>
-  </p:timing>
-</p:sld>
-</file>
-
 <file path=ppt/slides/slide12.xml><?xml version="1.0" encoding="utf-8"?>
 <p:sld xmlns:a="http://schemas.openxmlformats.org/drawingml/2006/main" xmlns:r="http://schemas.openxmlformats.org/officeDocument/2006/relationships" xmlns:p="http://schemas.openxmlformats.org/presentationml/2006/main">
   <p:cSld>
@@ -4224,25 +4294,11 @@
                   <a:srgbClr val="92D050"/>
                 </a:solidFill>
               </a:rPr>
-              <a:t>Linguagem</a:t>
-            </a:r>
-            <a:r>
-              <a:rPr lang="pt-BR" dirty="0" smtClean="0"/>
-              <a:t>: conjunto de palavras e regras sintáticas para se escrever um programa.</a:t>
-            </a:r>
-          </a:p>
-          <a:p>
-            <a:r>
-              <a:rPr lang="pt-BR" dirty="0" err="1" smtClean="0">
-                <a:solidFill>
-                  <a:srgbClr val="92D050"/>
-                </a:solidFill>
-              </a:rPr>
-              <a:t>Código-fonte</a:t>
-            </a:r>
-            <a:r>
-              <a:rPr lang="pt-BR" dirty="0" smtClean="0"/>
-              <a:t>: texto escrito em uma determinada linguagem por um programador, com um conjunto de instruções a serem realizadas pelo programa.</a:t>
+              <a:t>Programa: </a:t>
+            </a:r>
+            <a:r>
+              <a:rPr lang="pt-BR" dirty="0" smtClean="0"/>
+              <a:t>conjunto de instruções que descrevem tarefas a serem realizadas pelo computador.</a:t>
             </a:r>
             <a:endParaRPr lang="pt-BR" dirty="0" smtClean="0">
               <a:solidFill>
@@ -4257,11 +4313,74 @@
                   <a:srgbClr val="92D050"/>
                 </a:solidFill>
               </a:rPr>
-              <a:t>Compilador</a:t>
-            </a:r>
-            <a:r>
-              <a:rPr lang="pt-BR" dirty="0" smtClean="0"/>
-              <a:t>: programa especial que converte o código-fonte que o programador escreveu em um arquivo binário.</a:t>
+              <a:t>Programa: </a:t>
+            </a:r>
+            <a:r>
+              <a:rPr lang="pt-BR" dirty="0" smtClean="0"/>
+              <a:t>conjunto dos arquivos binários e periféricos armazenados no disco rígido.</a:t>
+            </a:r>
+          </a:p>
+          <a:p>
+            <a:r>
+              <a:rPr lang="pt-BR" dirty="0" smtClean="0"/>
+              <a:t>Um programa tem as seguintes características:</a:t>
+            </a:r>
+          </a:p>
+          <a:p>
+            <a:pPr lvl="1"/>
+            <a:r>
+              <a:rPr lang="pt-BR" dirty="0" smtClean="0"/>
+              <a:t>É escrito em uma determinada </a:t>
+            </a:r>
+            <a:r>
+              <a:rPr lang="pt-BR" dirty="0" smtClean="0">
+                <a:solidFill>
+                  <a:srgbClr val="92D050"/>
+                </a:solidFill>
+              </a:rPr>
+              <a:t>linguagem</a:t>
+            </a:r>
+            <a:r>
+              <a:rPr lang="pt-BR" dirty="0" smtClean="0"/>
+              <a:t>;</a:t>
+            </a:r>
+          </a:p>
+          <a:p>
+            <a:pPr lvl="1"/>
+            <a:r>
+              <a:rPr lang="pt-BR" dirty="0" smtClean="0"/>
+              <a:t>O texto escrito pelo programador chama-se </a:t>
+            </a:r>
+            <a:r>
+              <a:rPr lang="pt-BR" dirty="0" smtClean="0">
+                <a:solidFill>
+                  <a:srgbClr val="92D050"/>
+                </a:solidFill>
+              </a:rPr>
+              <a:t>código-fonte</a:t>
+            </a:r>
+            <a:r>
+              <a:rPr lang="pt-BR" dirty="0" smtClean="0"/>
+              <a:t>;</a:t>
+            </a:r>
+          </a:p>
+          <a:p>
+            <a:pPr lvl="1"/>
+            <a:r>
+              <a:rPr lang="pt-BR" dirty="0" smtClean="0"/>
+              <a:t>Possui um arquivo </a:t>
+            </a:r>
+            <a:r>
+              <a:rPr lang="pt-BR" dirty="0" smtClean="0">
+                <a:solidFill>
+                  <a:srgbClr val="92D050"/>
+                </a:solidFill>
+              </a:rPr>
+              <a:t>executável</a:t>
+            </a:r>
+            <a:r>
+              <a:rPr lang="pt-BR" dirty="0" smtClean="0"/>
+              <a:t>.</a:t>
             </a:r>
           </a:p>
         </p:txBody>
@@ -4334,7 +4453,7 @@
         <p:spPr/>
         <p:txBody>
           <a:bodyPr>
-            <a:normAutofit lnSpcReduction="10000"/>
+            <a:normAutofit fontScale="92500" lnSpcReduction="10000"/>
           </a:bodyPr>
           <a:lstStyle/>
           <a:p>
@@ -4344,12 +4463,31 @@
                   <a:srgbClr val="92D050"/>
                 </a:solidFill>
               </a:rPr>
-              <a:t>Editor de texto</a:t>
-            </a:r>
-            <a:r>
-              <a:rPr lang="pt-BR" dirty="0" smtClean="0"/>
-              <a:t>: programa em que o usuário pode escrever em texto sem formatação.</a:t>
-            </a:r>
+              <a:t>Linguagem</a:t>
+            </a:r>
+            <a:r>
+              <a:rPr lang="pt-BR" dirty="0" smtClean="0"/>
+              <a:t>: conjunto de palavras e regras sintáticas para se escrever um programa.</a:t>
+            </a:r>
+          </a:p>
+          <a:p>
+            <a:r>
+              <a:rPr lang="pt-BR" dirty="0" err="1" smtClean="0">
+                <a:solidFill>
+                  <a:srgbClr val="92D050"/>
+                </a:solidFill>
+              </a:rPr>
+              <a:t>Código-fonte</a:t>
+            </a:r>
+            <a:r>
+              <a:rPr lang="pt-BR" dirty="0" smtClean="0"/>
+              <a:t>: texto escrito em uma determinada linguagem por um programador, com um conjunto de instruções a serem realizadas pelo programa.</a:t>
+            </a:r>
+            <a:endParaRPr lang="pt-BR" dirty="0" smtClean="0">
+              <a:solidFill>
+                <a:srgbClr val="92D050"/>
+              </a:solidFill>
+            </a:endParaRPr>
           </a:p>
           <a:p>
             <a:r>
@@ -4358,55 +4496,12 @@
                   <a:srgbClr val="92D050"/>
                 </a:solidFill>
               </a:rPr>
-              <a:t>Terminal</a:t>
-            </a:r>
-            <a:r>
-              <a:rPr lang="pt-BR" dirty="0" smtClean="0"/>
-              <a:t>: tela em que o usuário pode digitar comandos e obter a resposta.</a:t>
-            </a:r>
-          </a:p>
-          <a:p>
-            <a:r>
-              <a:rPr lang="pt-BR" dirty="0" smtClean="0">
-                <a:solidFill>
-                  <a:srgbClr val="92D050"/>
-                </a:solidFill>
-              </a:rPr>
-              <a:t>IDE</a:t>
-            </a:r>
-            <a:r>
-              <a:rPr lang="pt-BR" dirty="0" smtClean="0"/>
-              <a:t> (</a:t>
-            </a:r>
-            <a:r>
-              <a:rPr lang="pt-BR" dirty="0" err="1" smtClean="0"/>
-              <a:t>Integrated</a:t>
-            </a:r>
-            <a:r>
-              <a:rPr lang="pt-BR" dirty="0" smtClean="0"/>
-              <a:t> </a:t>
-            </a:r>
-            <a:r>
-              <a:rPr lang="pt-BR" dirty="0" err="1" smtClean="0"/>
-              <a:t>Development</a:t>
-            </a:r>
-            <a:r>
-              <a:rPr lang="pt-BR" dirty="0" smtClean="0"/>
-              <a:t> </a:t>
-            </a:r>
-            <a:r>
-              <a:rPr lang="pt-BR" dirty="0" err="1" smtClean="0"/>
-              <a:t>Environment</a:t>
-            </a:r>
-            <a:r>
-              <a:rPr lang="pt-BR" dirty="0" smtClean="0"/>
-              <a:t>): Ambiente de Desenvolvimento Integrado, é um programa que facilita bastante a </a:t>
-            </a:r>
-            <a:r>
-              <a:rPr lang="pt-BR" dirty="0" smtClean="0"/>
-              <a:t>programação.</a:t>
-            </a:r>
-            <a:endParaRPr lang="pt-BR" dirty="0"/>
+              <a:t>Compilador</a:t>
+            </a:r>
+            <a:r>
+              <a:rPr lang="pt-BR" dirty="0" smtClean="0"/>
+              <a:t>: programa especial que converte o código-fonte que o programador escreveu em um arquivo binário.</a:t>
+            </a:r>
           </a:p>
         </p:txBody>
       </p:sp>
@@ -4415,6 +4510,13 @@
   <p:clrMapOvr>
     <a:masterClrMapping/>
   </p:clrMapOvr>
+  <p:timing>
+    <p:tnLst>
+      <p:par>
+        <p:cTn id="1" dur="indefinite" restart="never" nodeType="tmRoot"/>
+      </p:par>
+    </p:tnLst>
+  </p:timing>
 </p:sld>
 </file>
 
@@ -4452,7 +4554,7 @@
           <a:p>
             <a:r>
               <a:rPr lang="pt-BR" dirty="0" smtClean="0"/>
-              <a:t>Conclusão</a:t>
+              <a:t>Conceitos</a:t>
             </a:r>
             <a:endParaRPr lang="pt-BR" dirty="0"/>
           </a:p>
@@ -4470,31 +4572,76 @@
         </p:nvSpPr>
         <p:spPr/>
         <p:txBody>
-          <a:bodyPr/>
-          <a:lstStyle/>
-          <a:p>
-            <a:r>
-              <a:rPr lang="pt-BR" dirty="0" smtClean="0"/>
-              <a:t>Área de atuação do profissional de programação é gigantesca</a:t>
-            </a:r>
-          </a:p>
-          <a:p>
-            <a:r>
-              <a:rPr lang="pt-BR" dirty="0" smtClean="0"/>
-              <a:t>Grande variedade de tecnologias</a:t>
-            </a:r>
-          </a:p>
-          <a:p>
-            <a:r>
-              <a:rPr lang="pt-BR" dirty="0" smtClean="0"/>
-              <a:t>A programação caminha para independência de SO, vinculando o programador a uma plataforma</a:t>
-            </a:r>
-          </a:p>
-          <a:p>
-            <a:r>
-              <a:rPr lang="pt-BR" dirty="0" smtClean="0"/>
-              <a:t>Uma vez compilado, o aplicativo roda em qualquer dispositivo que tenha a plataforma instalada</a:t>
-            </a:r>
+          <a:bodyPr>
+            <a:normAutofit lnSpcReduction="10000"/>
+          </a:bodyPr>
+          <a:lstStyle/>
+          <a:p>
+            <a:r>
+              <a:rPr lang="pt-BR" dirty="0" smtClean="0">
+                <a:solidFill>
+                  <a:srgbClr val="92D050"/>
+                </a:solidFill>
+              </a:rPr>
+              <a:t>Editor de texto</a:t>
+            </a:r>
+            <a:r>
+              <a:rPr lang="pt-BR" dirty="0" smtClean="0"/>
+              <a:t>: programa em que o usuário pode escrever em texto sem formatação.</a:t>
+            </a:r>
+          </a:p>
+          <a:p>
+            <a:r>
+              <a:rPr lang="pt-BR" dirty="0" smtClean="0">
+                <a:solidFill>
+                  <a:srgbClr val="92D050"/>
+                </a:solidFill>
+              </a:rPr>
+              <a:t>Terminal</a:t>
+            </a:r>
+            <a:r>
+              <a:rPr lang="pt-BR" dirty="0" smtClean="0"/>
+              <a:t>: tela em que o usuário pode digitar comandos e obter a resposta.</a:t>
+            </a:r>
+          </a:p>
+          <a:p>
+            <a:r>
+              <a:rPr lang="pt-BR" dirty="0" smtClean="0">
+                <a:solidFill>
+                  <a:srgbClr val="92D050"/>
+                </a:solidFill>
+              </a:rPr>
+              <a:t>IDE</a:t>
+            </a:r>
+            <a:r>
+              <a:rPr lang="pt-BR" dirty="0" smtClean="0"/>
+              <a:t> (</a:t>
+            </a:r>
+            <a:r>
+              <a:rPr lang="pt-BR" dirty="0" err="1" smtClean="0"/>
+              <a:t>Integrated</a:t>
+            </a:r>
+            <a:r>
+              <a:rPr lang="pt-BR" dirty="0" smtClean="0"/>
+              <a:t> </a:t>
+            </a:r>
+            <a:r>
+              <a:rPr lang="pt-BR" dirty="0" err="1" smtClean="0"/>
+              <a:t>Development</a:t>
+            </a:r>
+            <a:r>
+              <a:rPr lang="pt-BR" dirty="0" smtClean="0"/>
+              <a:t> </a:t>
+            </a:r>
+            <a:r>
+              <a:rPr lang="pt-BR" dirty="0" err="1" smtClean="0"/>
+              <a:t>Environment</a:t>
+            </a:r>
+            <a:r>
+              <a:rPr lang="pt-BR" dirty="0" smtClean="0"/>
+              <a:t>): Ambiente de Desenvolvimento Integrado, é um programa que facilita bastante a programação.</a:t>
+            </a:r>
+            <a:endParaRPr lang="pt-BR" dirty="0"/>
           </a:p>
         </p:txBody>
       </p:sp>
@@ -4547,7 +4694,7 @@
           <a:p>
             <a:r>
               <a:rPr lang="pt-BR" dirty="0" smtClean="0"/>
-              <a:t>Referências</a:t>
+              <a:t>Conclusão</a:t>
             </a:r>
             <a:endParaRPr lang="pt-BR" dirty="0"/>
           </a:p>
@@ -4570,57 +4717,25 @@
           <a:p>
             <a:r>
               <a:rPr lang="pt-BR" dirty="0" smtClean="0"/>
-              <a:t>[1] GDP 30/05/2012. </a:t>
-            </a:r>
-            <a:r>
-              <a:rPr lang="pt-BR" dirty="0" smtClean="0">
-                <a:hlinkClick r:id="rId2"/>
-              </a:rPr>
-              <a:t>http://www.gazetadopovo.com.br/posgraduacao/conteudo.</a:t>
-            </a:r>
-            <a:r>
-              <a:rPr lang="pt-BR" dirty="0" err="1" smtClean="0">
-                <a:hlinkClick r:id="rId2"/>
-              </a:rPr>
-              <a:t>phtml</a:t>
-            </a:r>
-            <a:r>
-              <a:rPr lang="pt-BR" dirty="0" smtClean="0">
-                <a:hlinkClick r:id="rId2"/>
-              </a:rPr>
-              <a:t>?id=1260155</a:t>
-            </a:r>
-            <a:endParaRPr lang="pt-BR" dirty="0" smtClean="0"/>
-          </a:p>
-          <a:p>
-            <a:r>
-              <a:rPr lang="pt-BR" dirty="0" smtClean="0"/>
-              <a:t>[2] GDP 29/12/2013. </a:t>
-            </a:r>
-            <a:r>
-              <a:rPr lang="pt-BR" dirty="0" smtClean="0">
-                <a:hlinkClick r:id="rId3"/>
-              </a:rPr>
-              <a:t>http://www.gazetadopovo.com.br/posgraduacao/conteudo.</a:t>
-            </a:r>
-            <a:r>
-              <a:rPr lang="pt-BR" dirty="0" err="1" smtClean="0">
-                <a:hlinkClick r:id="rId3"/>
-              </a:rPr>
-              <a:t>phtml</a:t>
-            </a:r>
-            <a:r>
-              <a:rPr lang="pt-BR" dirty="0" smtClean="0">
-                <a:hlinkClick r:id="rId3"/>
-              </a:rPr>
-              <a:t>?id=1436279</a:t>
-            </a:r>
-            <a:endParaRPr lang="pt-BR" dirty="0" smtClean="0"/>
-          </a:p>
-          <a:p>
-            <a:r>
-              <a:rPr lang="pt-BR" dirty="0" smtClean="0"/>
-              <a:t>[3] Code.org, iniciativa global para ensinar programação</a:t>
+              <a:t>Área de atuação do profissional de programação é gigantesca</a:t>
+            </a:r>
+          </a:p>
+          <a:p>
+            <a:r>
+              <a:rPr lang="pt-BR" dirty="0" smtClean="0"/>
+              <a:t>Grande variedade de tecnologias</a:t>
+            </a:r>
+          </a:p>
+          <a:p>
+            <a:r>
+              <a:rPr lang="pt-BR" dirty="0" smtClean="0"/>
+              <a:t>A programação caminha para independência de SO, vinculando o programador a uma plataforma</a:t>
+            </a:r>
+          </a:p>
+          <a:p>
+            <a:r>
+              <a:rPr lang="pt-BR" dirty="0" smtClean="0"/>
+              <a:t>Uma vez compilado, o aplicativo roda em qualquer dispositivo que tenha a plataforma instalada</a:t>
             </a:r>
           </a:p>
         </p:txBody>
@@ -4693,81 +4808,75 @@
         <p:spPr/>
         <p:txBody>
           <a:bodyPr>
-            <a:normAutofit fontScale="92500" lnSpcReduction="10000"/>
+            <a:normAutofit fontScale="92500" lnSpcReduction="20000"/>
           </a:bodyPr>
           <a:lstStyle/>
           <a:p>
             <a:r>
               <a:rPr lang="pt-BR" dirty="0" smtClean="0"/>
-              <a:t>[4] Uso de sistemas operacionais. </a:t>
+              <a:t>[1] GDP 30/05/2012. </a:t>
             </a:r>
             <a:r>
               <a:rPr lang="pt-BR" dirty="0" smtClean="0">
                 <a:hlinkClick r:id="rId2"/>
               </a:rPr>
-              <a:t>http://en.wikipedia.org/wiki/Usage_share_of_operating_systems</a:t>
+              <a:t>http://www.gazetadopovo.com.br/posgraduacao/conteudo.</a:t>
+            </a:r>
+            <a:r>
+              <a:rPr lang="pt-BR" dirty="0" err="1" smtClean="0">
+                <a:hlinkClick r:id="rId2"/>
+              </a:rPr>
+              <a:t>phtml</a:t>
+            </a:r>
+            <a:r>
+              <a:rPr lang="pt-BR" dirty="0" smtClean="0">
+                <a:hlinkClick r:id="rId2"/>
+              </a:rPr>
+              <a:t>?id=1260155</a:t>
             </a:r>
             <a:endParaRPr lang="pt-BR" dirty="0" smtClean="0"/>
           </a:p>
           <a:p>
             <a:r>
               <a:rPr lang="pt-BR" dirty="0" smtClean="0"/>
-              <a:t>[5] 4 Razões Dizer Sim ao Código Aberto. </a:t>
+              <a:t>[2] GDP 29/12/2013. </a:t>
             </a:r>
             <a:r>
               <a:rPr lang="pt-BR" dirty="0" smtClean="0">
                 <a:hlinkClick r:id="rId3"/>
               </a:rPr>
-              <a:t>http://www.computerworld.com/s/article/print/9244898/4_reasons_companies_say_yes_to_open_source?</a:t>
+              <a:t>http://www.gazetadopovo.com.br/posgraduacao/conteudo.</a:t>
             </a:r>
             <a:r>
               <a:rPr lang="pt-BR" dirty="0" err="1" smtClean="0">
                 <a:hlinkClick r:id="rId3"/>
               </a:rPr>
-              <a:t>taxonomyName</a:t>
+              <a:t>phtml</a:t>
             </a:r>
             <a:r>
               <a:rPr lang="pt-BR" dirty="0" smtClean="0">
                 <a:hlinkClick r:id="rId3"/>
               </a:rPr>
-              <a:t>=</a:t>
-            </a:r>
-            <a:r>
-              <a:rPr lang="pt-BR" dirty="0" err="1" smtClean="0">
-                <a:hlinkClick r:id="rId3"/>
-              </a:rPr>
-              <a:t>App</a:t>
-            </a:r>
-            <a:r>
-              <a:rPr lang="pt-BR" dirty="0" smtClean="0">
-                <a:hlinkClick r:id="rId3"/>
-              </a:rPr>
-              <a:t>+</a:t>
-            </a:r>
-            <a:r>
-              <a:rPr lang="pt-BR" dirty="0" err="1" smtClean="0">
-                <a:hlinkClick r:id="rId3"/>
-              </a:rPr>
-              <a:t>Development&amp;taxonomyId</a:t>
-            </a:r>
-            <a:r>
-              <a:rPr lang="pt-BR" dirty="0" smtClean="0">
-                <a:hlinkClick r:id="rId3"/>
-              </a:rPr>
-              <a:t>=11</a:t>
+              <a:t>?id=1436279</a:t>
             </a:r>
             <a:endParaRPr lang="pt-BR" dirty="0" smtClean="0"/>
           </a:p>
           <a:p>
             <a:r>
               <a:rPr lang="pt-BR" dirty="0" smtClean="0"/>
-              <a:t>[6] Plataforma .NET. </a:t>
+              <a:t>[3] Code.org, iniciativa global para ensinar programação</a:t>
+            </a:r>
+          </a:p>
+          <a:p>
+            <a:r>
+              <a:rPr lang="pt-BR" dirty="0" smtClean="0"/>
+              <a:t>[4] Eu posso programar (Microsoft) </a:t>
             </a:r>
             <a:r>
               <a:rPr lang="pt-BR" dirty="0" smtClean="0">
                 <a:hlinkClick r:id="rId4"/>
               </a:rPr>
-              <a:t>http://pt.wikipedia.org/wiki/Microsoft_.NET</a:t>
+              <a:t>https://www.eupossoprogramar.com/default.aspx</a:t>
             </a:r>
             <a:endParaRPr lang="pt-BR" dirty="0" smtClean="0"/>
           </a:p>
@@ -4841,65 +4950,185 @@
         <p:spPr/>
         <p:txBody>
           <a:bodyPr>
-            <a:normAutofit fontScale="92500" lnSpcReduction="10000"/>
+            <a:normAutofit fontScale="92500"/>
           </a:bodyPr>
           <a:lstStyle/>
           <a:p>
             <a:r>
               <a:rPr lang="pt-BR" dirty="0" smtClean="0"/>
-              <a:t>[7] Plataforma Mono. </a:t>
+              <a:t>[5] </a:t>
+            </a:r>
+            <a:r>
+              <a:rPr lang="pt-BR" dirty="0" err="1" smtClean="0"/>
+              <a:t>CodinGame</a:t>
+            </a:r>
+            <a:r>
+              <a:rPr lang="pt-BR" dirty="0" smtClean="0"/>
+              <a:t>. </a:t>
             </a:r>
             <a:r>
               <a:rPr lang="pt-BR" dirty="0" smtClean="0">
                 <a:hlinkClick r:id="rId2"/>
               </a:rPr>
-              <a:t>http://pt.wikipedia.org/wiki/Mono_(projeto)</a:t>
+              <a:t>https://www.codingame.com/start</a:t>
             </a:r>
             <a:endParaRPr lang="pt-BR" dirty="0" smtClean="0"/>
           </a:p>
           <a:p>
             <a:r>
               <a:rPr lang="pt-BR" dirty="0" smtClean="0"/>
-              <a:t>[8] O que é Mono? </a:t>
+              <a:t>[6] Uso de sistemas operacionais. </a:t>
             </a:r>
             <a:r>
               <a:rPr lang="pt-BR" dirty="0" smtClean="0">
                 <a:hlinkClick r:id="rId3"/>
               </a:rPr>
-              <a:t>http://www.mono-project.com/What_is_Mono</a:t>
+              <a:t>http://en.wikipedia.org/wiki/Usage_share_of_operating_systems</a:t>
             </a:r>
             <a:endParaRPr lang="pt-BR" dirty="0" smtClean="0"/>
           </a:p>
           <a:p>
             <a:r>
               <a:rPr lang="pt-BR" dirty="0" smtClean="0"/>
-              <a:t>[9] C#. </a:t>
+              <a:t>[7] Plataforma .NET. </a:t>
             </a:r>
             <a:r>
               <a:rPr lang="pt-BR" dirty="0" smtClean="0">
                 <a:hlinkClick r:id="rId4"/>
               </a:rPr>
-              <a:t>http://pt.wikipedia.org/wiki/C_Sharp</a:t>
+              <a:t>http://pt.wikipedia.org/wiki/Microsoft_.NET</a:t>
             </a:r>
             <a:endParaRPr lang="pt-BR" dirty="0" smtClean="0"/>
           </a:p>
           <a:p>
             <a:r>
               <a:rPr lang="pt-BR" dirty="0" smtClean="0"/>
-              <a:t>[10] Anders </a:t>
-            </a:r>
-            <a:r>
-              <a:rPr lang="pt-BR" dirty="0" err="1" smtClean="0"/>
-              <a:t>Hejlsberg</a:t>
-            </a:r>
-            <a:r>
-              <a:rPr lang="pt-BR" dirty="0" smtClean="0"/>
-              <a:t>. </a:t>
+              <a:t>[8] Plataforma Mono. </a:t>
             </a:r>
             <a:r>
               <a:rPr lang="pt-BR" dirty="0" smtClean="0">
                 <a:hlinkClick r:id="rId5"/>
               </a:rPr>
+              <a:t>http://pt.wikipedia.org/wiki/Mono_(projeto)</a:t>
+            </a:r>
+            <a:endParaRPr lang="pt-BR" dirty="0" smtClean="0"/>
+          </a:p>
+        </p:txBody>
+      </p:sp>
+    </p:spTree>
+  </p:cSld>
+  <p:clrMapOvr>
+    <a:masterClrMapping/>
+  </p:clrMapOvr>
+  <p:timing>
+    <p:tnLst>
+      <p:par>
+        <p:cTn id="1" dur="indefinite" restart="never" nodeType="tmRoot"/>
+      </p:par>
+    </p:tnLst>
+  </p:timing>
+</p:sld>
+</file>
+
+<file path=ppt/slides/slide18.xml><?xml version="1.0" encoding="utf-8"?>
+<p:sld xmlns:a="http://schemas.openxmlformats.org/drawingml/2006/main" xmlns:r="http://schemas.openxmlformats.org/officeDocument/2006/relationships" xmlns:p="http://schemas.openxmlformats.org/presentationml/2006/main">
+  <p:cSld>
+    <p:spTree>
+      <p:nvGrpSpPr>
+        <p:cNvPr id="1" name=""/>
+        <p:cNvGrpSpPr/>
+        <p:nvPr/>
+      </p:nvGrpSpPr>
+      <p:grpSpPr>
+        <a:xfrm>
+          <a:off x="0" y="0"/>
+          <a:ext cx="0" cy="0"/>
+          <a:chOff x="0" y="0"/>
+          <a:chExt cx="0" cy="0"/>
+        </a:xfrm>
+      </p:grpSpPr>
+      <p:sp>
+        <p:nvSpPr>
+          <p:cNvPr id="2" name="Título 1"/>
+          <p:cNvSpPr>
+            <a:spLocks noGrp="1"/>
+          </p:cNvSpPr>
+          <p:nvPr>
+            <p:ph type="title"/>
+          </p:nvPr>
+        </p:nvSpPr>
+        <p:spPr/>
+        <p:txBody>
+          <a:bodyPr/>
+          <a:lstStyle/>
+          <a:p>
+            <a:r>
+              <a:rPr lang="pt-BR" dirty="0" smtClean="0"/>
+              <a:t>Referências</a:t>
+            </a:r>
+            <a:endParaRPr lang="pt-BR" dirty="0"/>
+          </a:p>
+        </p:txBody>
+      </p:sp>
+      <p:sp>
+        <p:nvSpPr>
+          <p:cNvPr id="3" name="Espaço Reservado para Conteúdo 2"/>
+          <p:cNvSpPr>
+            <a:spLocks noGrp="1"/>
+          </p:cNvSpPr>
+          <p:nvPr>
+            <p:ph idx="1"/>
+          </p:nvPr>
+        </p:nvSpPr>
+        <p:spPr/>
+        <p:txBody>
+          <a:bodyPr>
+            <a:normAutofit lnSpcReduction="10000"/>
+          </a:bodyPr>
+          <a:lstStyle/>
+          <a:p>
+            <a:r>
+              <a:rPr lang="pt-BR" dirty="0" smtClean="0"/>
+              <a:t>[9] O que é Mono? </a:t>
+            </a:r>
+            <a:r>
+              <a:rPr lang="pt-BR" dirty="0" smtClean="0">
+                <a:hlinkClick r:id="rId2"/>
+              </a:rPr>
+              <a:t>http://www.mono-project.com/What_is_Mono</a:t>
+            </a:r>
+            <a:endParaRPr lang="pt-BR" dirty="0" smtClean="0"/>
+          </a:p>
+          <a:p>
+            <a:r>
+              <a:rPr lang="pt-BR" dirty="0" smtClean="0"/>
+              <a:t>[10] C#. </a:t>
+            </a:r>
+            <a:r>
+              <a:rPr lang="pt-BR" dirty="0" smtClean="0">
+                <a:hlinkClick r:id="rId3"/>
+              </a:rPr>
+              <a:t>http://pt.wikipedia.org/wiki/C_Sharp</a:t>
+            </a:r>
+            <a:endParaRPr lang="pt-BR" dirty="0" smtClean="0"/>
+          </a:p>
+          <a:p>
+            <a:r>
+              <a:rPr lang="pt-BR" dirty="0" smtClean="0"/>
+              <a:t>[11] Anders </a:t>
+            </a:r>
+            <a:r>
+              <a:rPr lang="pt-BR" dirty="0" err="1" smtClean="0"/>
+              <a:t>Hejlsberg</a:t>
+            </a:r>
+            <a:r>
+              <a:rPr lang="pt-BR" dirty="0" smtClean="0"/>
+              <a:t>. </a:t>
+            </a:r>
+            <a:r>
+              <a:rPr lang="pt-BR" dirty="0" smtClean="0">
+                <a:hlinkClick r:id="rId4"/>
+              </a:rPr>
               <a:t>http://pt.wikipedia.org/wiki/Anders_Hejlsberg</a:t>
             </a:r>
             <a:endParaRPr lang="pt-BR" dirty="0" smtClean="0"/>
@@ -4907,7 +5136,7 @@
           <a:p>
             <a:r>
               <a:rPr lang="pt-BR" dirty="0" smtClean="0"/>
-              <a:t>[11] Miguel de </a:t>
+              <a:t>[12] Miguel de </a:t>
             </a:r>
             <a:r>
               <a:rPr lang="pt-BR" dirty="0" err="1" smtClean="0"/>
@@ -4919,7 +5148,7 @@
             </a:r>
             <a:r>
               <a:rPr lang="pt-BR" dirty="0" smtClean="0">
-                <a:hlinkClick r:id="rId6"/>
+                <a:hlinkClick r:id="rId5"/>
               </a:rPr>
               <a:t>http://pt.wikipedia.org/wiki/Miguel_de_Icaza</a:t>
             </a:r>
@@ -5114,13 +5343,29 @@
           <a:p>
             <a:r>
               <a:rPr lang="pt-BR" dirty="0" smtClean="0"/>
-              <a:t>Programador há 8 anos</a:t>
-            </a:r>
-          </a:p>
-          <a:p>
-            <a:r>
-              <a:rPr lang="pt-BR" dirty="0" smtClean="0"/>
-              <a:t>Há 3 anos com C#</a:t>
+              <a:t>Programador há </a:t>
+            </a:r>
+            <a:r>
+              <a:rPr lang="pt-BR" dirty="0" smtClean="0"/>
+              <a:t>10 </a:t>
+            </a:r>
+            <a:r>
+              <a:rPr lang="pt-BR" dirty="0" smtClean="0"/>
+              <a:t>anos</a:t>
+            </a:r>
+          </a:p>
+          <a:p>
+            <a:r>
+              <a:rPr lang="pt-BR" dirty="0" smtClean="0"/>
+              <a:t>Há </a:t>
+            </a:r>
+            <a:r>
+              <a:rPr lang="pt-BR" dirty="0" smtClean="0"/>
+              <a:t>5 </a:t>
+            </a:r>
+            <a:r>
+              <a:rPr lang="pt-BR" dirty="0" smtClean="0"/>
+              <a:t>anos com C#</a:t>
             </a:r>
           </a:p>
           <a:p>
@@ -5461,11 +5706,7 @@
           <a:p>
             <a:r>
               <a:rPr lang="pt-BR" dirty="0" smtClean="0"/>
-              <a:t>Tendências - </a:t>
-            </a:r>
-            <a:r>
-              <a:rPr lang="pt-BR" dirty="0" err="1" smtClean="0"/>
-              <a:t>PCs</a:t>
+              <a:t>Tendências – Clientes Web</a:t>
             </a:r>
             <a:endParaRPr lang="pt-BR" dirty="0"/>
           </a:p>
@@ -5492,7 +5733,7 @@
       </p:sp>
       <p:pic>
         <p:nvPicPr>
-          <p:cNvPr id="1026" name="Picture 2"/>
+          <p:cNvPr id="4" name="Picture 2"/>
           <p:cNvPicPr>
             <a:picLocks noChangeAspect="1" noChangeArrowheads="1"/>
           </p:cNvPicPr>
@@ -5507,8 +5748,8 @@
         </p:blipFill>
         <p:spPr bwMode="auto">
           <a:xfrm>
-            <a:off x="571472" y="2143116"/>
-            <a:ext cx="7248079" cy="3429024"/>
+            <a:off x="500033" y="2143116"/>
+            <a:ext cx="7893899" cy="3357586"/>
           </a:xfrm>
           <a:prstGeom prst="rect">
             <a:avLst/>
@@ -5572,7 +5813,7 @@
           <a:p>
             <a:r>
               <a:rPr lang="pt-BR" dirty="0" smtClean="0"/>
-              <a:t>Tendências - Servidores</a:t>
+              <a:t>Tendências – Servidores Web</a:t>
             </a:r>
             <a:endParaRPr lang="pt-BR" dirty="0"/>
           </a:p>
@@ -5599,7 +5840,7 @@
       </p:sp>
       <p:pic>
         <p:nvPicPr>
-          <p:cNvPr id="2050" name="Picture 2"/>
+          <p:cNvPr id="2051" name="Picture 3"/>
           <p:cNvPicPr>
             <a:picLocks noChangeAspect="1" noChangeArrowheads="1"/>
           </p:cNvPicPr>
@@ -5614,8 +5855,8 @@
         </p:blipFill>
         <p:spPr bwMode="auto">
           <a:xfrm>
-            <a:off x="785786" y="1785926"/>
-            <a:ext cx="6215106" cy="4208301"/>
+            <a:off x="357158" y="2285992"/>
+            <a:ext cx="8286808" cy="1074465"/>
           </a:xfrm>
           <a:prstGeom prst="rect">
             <a:avLst/>
@@ -5674,12 +5915,14 @@
         </p:nvSpPr>
         <p:spPr/>
         <p:txBody>
-          <a:bodyPr/>
-          <a:lstStyle/>
-          <a:p>
-            <a:r>
-              <a:rPr lang="pt-BR" dirty="0" smtClean="0"/>
-              <a:t>Plataforma .NET (Microsoft)</a:t>
+          <a:bodyPr>
+            <a:normAutofit fontScale="90000"/>
+          </a:bodyPr>
+          <a:lstStyle/>
+          <a:p>
+            <a:r>
+              <a:rPr lang="pt-BR" dirty="0" smtClean="0"/>
+              <a:t>Tendências - Supercomputadores</a:t>
             </a:r>
             <a:endParaRPr lang="pt-BR" dirty="0"/>
           </a:p>
@@ -5695,103 +5938,12 @@
             <p:ph idx="1"/>
           </p:nvPr>
         </p:nvSpPr>
-        <p:spPr>
-          <a:xfrm>
-            <a:off x="457200" y="1600200"/>
-            <a:ext cx="5257808" cy="4525963"/>
-          </a:xfrm>
-        </p:spPr>
-        <p:txBody>
-          <a:bodyPr>
-            <a:normAutofit fontScale="92500" lnSpcReduction="20000"/>
-          </a:bodyPr>
-          <a:lstStyle/>
-          <a:p>
-            <a:r>
-              <a:rPr lang="pt-BR" dirty="0" smtClean="0"/>
-              <a:t>Lançado em 13/02/2002, foi uma resposta ao </a:t>
-            </a:r>
-            <a:r>
-              <a:rPr lang="pt-BR" dirty="0" smtClean="0">
-                <a:solidFill>
-                  <a:srgbClr val="92D050"/>
-                </a:solidFill>
-              </a:rPr>
-              <a:t>Java</a:t>
-            </a:r>
-          </a:p>
-          <a:p>
-            <a:r>
-              <a:rPr lang="pt-BR" dirty="0" smtClean="0">
-                <a:solidFill>
-                  <a:srgbClr val="92D050"/>
-                </a:solidFill>
-              </a:rPr>
-              <a:t>Plataforma única</a:t>
-            </a:r>
-            <a:r>
-              <a:rPr lang="pt-BR" dirty="0" smtClean="0"/>
-              <a:t> para desenvolvimento e execução de aplicativos</a:t>
-            </a:r>
-          </a:p>
-          <a:p>
-            <a:r>
-              <a:rPr lang="pt-BR" dirty="0" smtClean="0"/>
-              <a:t>Todo código gerado para .NET pode ser rodado em </a:t>
-            </a:r>
-            <a:r>
-              <a:rPr lang="pt-BR" dirty="0" smtClean="0">
-                <a:solidFill>
-                  <a:srgbClr val="92D050"/>
-                </a:solidFill>
-              </a:rPr>
-              <a:t>qualquer dispositivo</a:t>
-            </a:r>
-            <a:r>
-              <a:rPr lang="pt-BR" dirty="0" smtClean="0"/>
-              <a:t> que tenha essa plataforma</a:t>
-            </a:r>
-          </a:p>
-          <a:p>
-            <a:r>
-              <a:rPr lang="pt-BR" dirty="0" smtClean="0"/>
-              <a:t>Linguagem </a:t>
-            </a:r>
-            <a:r>
-              <a:rPr lang="pt-BR" dirty="0" smtClean="0">
-                <a:solidFill>
-                  <a:srgbClr val="92D050"/>
-                </a:solidFill>
-              </a:rPr>
-              <a:t>C# </a:t>
-            </a:r>
-            <a:r>
-              <a:rPr lang="pt-BR" dirty="0" smtClean="0"/>
-              <a:t>criada por </a:t>
-            </a:r>
-            <a:r>
-              <a:rPr lang="pt-BR" dirty="0" smtClean="0">
-                <a:solidFill>
-                  <a:srgbClr val="92D050"/>
-                </a:solidFill>
-              </a:rPr>
-              <a:t>Anders </a:t>
-            </a:r>
-            <a:r>
-              <a:rPr lang="pt-BR" dirty="0" err="1" smtClean="0">
-                <a:solidFill>
-                  <a:srgbClr val="92D050"/>
-                </a:solidFill>
-              </a:rPr>
-              <a:t>Hejlsberg</a:t>
-            </a:r>
-            <a:r>
-              <a:rPr lang="pt-BR" dirty="0" smtClean="0"/>
-              <a:t> (criador do Delphi)</a:t>
-            </a:r>
-          </a:p>
-          <a:p>
-            <a:endParaRPr lang="pt-BR" dirty="0" smtClean="0"/>
+        <p:spPr/>
+        <p:txBody>
+          <a:bodyPr/>
+          <a:lstStyle/>
+          <a:p>
+            <a:endParaRPr lang="pt-BR" dirty="0"/>
           </a:p>
         </p:txBody>
       </p:sp>
@@ -5812,8 +5964,8 @@
         </p:blipFill>
         <p:spPr bwMode="auto">
           <a:xfrm>
-            <a:off x="5715008" y="1571612"/>
-            <a:ext cx="3071834" cy="4775540"/>
+            <a:off x="642910" y="1571612"/>
+            <a:ext cx="6786610" cy="4835869"/>
           </a:xfrm>
           <a:prstGeom prst="rect">
             <a:avLst/>
@@ -5893,90 +6045,49 @@
             <p:ph idx="1"/>
           </p:nvPr>
         </p:nvSpPr>
-        <p:spPr/>
-        <p:txBody>
-          <a:bodyPr/>
-          <a:lstStyle/>
-          <a:p>
-            <a:r>
-              <a:rPr lang="pt-BR" dirty="0" smtClean="0"/>
-              <a:t>Consiste de dois componentes principais:</a:t>
-            </a:r>
-          </a:p>
-          <a:p>
-            <a:pPr lvl="1"/>
+        <p:spPr>
+          <a:xfrm>
+            <a:off x="457200" y="1600200"/>
+            <a:ext cx="5257808" cy="4525963"/>
+          </a:xfrm>
+        </p:spPr>
+        <p:txBody>
+          <a:bodyPr>
+            <a:normAutofit fontScale="92500" lnSpcReduction="20000"/>
+          </a:bodyPr>
+          <a:lstStyle/>
+          <a:p>
+            <a:r>
+              <a:rPr lang="pt-BR" dirty="0" smtClean="0"/>
+              <a:t>Lançado em 13/02/2002, foi uma resposta ao </a:t>
+            </a:r>
             <a:r>
               <a:rPr lang="pt-BR" dirty="0" smtClean="0">
                 <a:solidFill>
                   <a:srgbClr val="92D050"/>
                 </a:solidFill>
               </a:rPr>
-              <a:t>CLR</a:t>
-            </a:r>
-            <a:r>
-              <a:rPr lang="pt-BR" dirty="0" smtClean="0"/>
-              <a:t> (</a:t>
-            </a:r>
-            <a:r>
-              <a:rPr lang="pt-BR" dirty="0" err="1" smtClean="0"/>
-              <a:t>Common</a:t>
-            </a:r>
-            <a:r>
-              <a:rPr lang="pt-BR" dirty="0" smtClean="0"/>
-              <a:t> </a:t>
-            </a:r>
-            <a:r>
-              <a:rPr lang="pt-BR" dirty="0" err="1" smtClean="0"/>
-              <a:t>Language</a:t>
-            </a:r>
-            <a:r>
-              <a:rPr lang="pt-BR" dirty="0" smtClean="0"/>
-              <a:t> </a:t>
-            </a:r>
-            <a:r>
-              <a:rPr lang="pt-BR" dirty="0" err="1" smtClean="0"/>
-              <a:t>Runtime</a:t>
-            </a:r>
-            <a:r>
-              <a:rPr lang="pt-BR" dirty="0" smtClean="0"/>
-              <a:t>)</a:t>
-            </a:r>
-          </a:p>
-          <a:p>
-            <a:pPr lvl="1"/>
+              <a:t>Java</a:t>
+            </a:r>
+          </a:p>
+          <a:p>
             <a:r>
               <a:rPr lang="pt-BR" dirty="0" smtClean="0">
                 <a:solidFill>
                   <a:srgbClr val="92D050"/>
                 </a:solidFill>
               </a:rPr>
-              <a:t>FCL</a:t>
-            </a:r>
-            <a:r>
-              <a:rPr lang="pt-BR" dirty="0" smtClean="0"/>
-              <a:t> (Framework </a:t>
-            </a:r>
-            <a:r>
-              <a:rPr lang="pt-BR" dirty="0" err="1" smtClean="0"/>
-              <a:t>Class</a:t>
-            </a:r>
-            <a:r>
-              <a:rPr lang="pt-BR" dirty="0" smtClean="0"/>
-              <a:t> </a:t>
-            </a:r>
-            <a:r>
-              <a:rPr lang="pt-BR" dirty="0" err="1" smtClean="0"/>
-              <a:t>Library</a:t>
-            </a:r>
-            <a:r>
-              <a:rPr lang="pt-BR" dirty="0" smtClean="0"/>
-              <a:t>)</a:t>
-            </a:r>
-          </a:p>
-          <a:p>
-            <a:r>
-              <a:rPr lang="pt-BR" dirty="0" smtClean="0"/>
-              <a:t>Essa arquitetura é capaz de executar </a:t>
+              <a:t>Plataforma única</a:t>
+            </a:r>
+            <a:r>
+              <a:rPr lang="pt-BR" dirty="0" smtClean="0"/>
+              <a:t> para desenvolvimento e execução de aplicativos</a:t>
+            </a:r>
+          </a:p>
+          <a:p>
+            <a:r>
+              <a:rPr lang="pt-BR" dirty="0" smtClean="0"/>
+              <a:t>Todo código gerado para .NET pode ser rodado em </a:t>
             </a:r>
             <a:r>
               <a:rPr lang="pt-BR" dirty="0" smtClean="0">
@@ -5984,32 +6095,17 @@
                   <a:srgbClr val="92D050"/>
                 </a:solidFill>
               </a:rPr>
-              <a:t>33</a:t>
-            </a:r>
-            <a:r>
-              <a:rPr lang="pt-BR" dirty="0" smtClean="0"/>
-              <a:t> linguagens de programação diferentes</a:t>
-            </a:r>
-          </a:p>
-          <a:p>
-            <a:pPr lvl="1"/>
-            <a:r>
-              <a:rPr lang="pt-BR" dirty="0" smtClean="0"/>
-              <a:t>C#, VB, Java, C++, </a:t>
-            </a:r>
-            <a:r>
-              <a:rPr lang="pt-BR" dirty="0" err="1" smtClean="0"/>
-              <a:t>Python</a:t>
-            </a:r>
-            <a:r>
-              <a:rPr lang="pt-BR" dirty="0" smtClean="0"/>
-              <a:t>, Pascal, Delphi...</a:t>
-            </a:r>
-          </a:p>
-          <a:p>
-            <a:r>
-              <a:rPr lang="pt-BR" dirty="0" smtClean="0"/>
-              <a:t>Também permite o desenvolvimento de </a:t>
+              <a:t>qualquer dispositivo</a:t>
+            </a:r>
+            <a:r>
+              <a:rPr lang="pt-BR" dirty="0" smtClean="0"/>
+              <a:t> que tenha essa plataforma</a:t>
+            </a:r>
+          </a:p>
+          <a:p>
+            <a:r>
+              <a:rPr lang="pt-BR" dirty="0" smtClean="0"/>
+              <a:t>Linguagem </a:t>
             </a:r>
             <a:r>
               <a:rPr lang="pt-BR" dirty="0" smtClean="0">
@@ -6017,14 +6113,41 @@
                   <a:srgbClr val="92D050"/>
                 </a:solidFill>
               </a:rPr>
-              <a:t>aplicações web</a:t>
-            </a:r>
+              <a:t>C# </a:t>
+            </a:r>
+            <a:r>
+              <a:rPr lang="pt-BR" dirty="0" smtClean="0"/>
+              <a:t>criada por </a:t>
+            </a:r>
+            <a:r>
+              <a:rPr lang="pt-BR" dirty="0" smtClean="0">
+                <a:solidFill>
+                  <a:srgbClr val="92D050"/>
+                </a:solidFill>
+              </a:rPr>
+              <a:t>Anders </a:t>
+            </a:r>
+            <a:r>
+              <a:rPr lang="pt-BR" dirty="0" err="1" smtClean="0">
+                <a:solidFill>
+                  <a:srgbClr val="92D050"/>
+                </a:solidFill>
+              </a:rPr>
+              <a:t>Hejlsberg</a:t>
+            </a:r>
+            <a:r>
+              <a:rPr lang="pt-BR" dirty="0" smtClean="0"/>
+              <a:t> (criador do Delphi)</a:t>
+            </a:r>
+          </a:p>
+          <a:p>
+            <a:endParaRPr lang="pt-BR" dirty="0" smtClean="0"/>
           </a:p>
         </p:txBody>
       </p:sp>
       <p:pic>
         <p:nvPicPr>
-          <p:cNvPr id="4" name="Picture 3"/>
+          <p:cNvPr id="3074" name="Picture 2"/>
           <p:cNvPicPr>
             <a:picLocks noChangeAspect="1" noChangeArrowheads="1"/>
           </p:cNvPicPr>
@@ -6039,8 +6162,8 @@
         </p:blipFill>
         <p:spPr bwMode="auto">
           <a:xfrm>
-            <a:off x="6307283" y="6072206"/>
-            <a:ext cx="2836717" cy="785794"/>
+            <a:off x="5715008" y="1571612"/>
+            <a:ext cx="3071834" cy="4775540"/>
           </a:xfrm>
           <a:prstGeom prst="rect">
             <a:avLst/>

</xml_diff>